<commit_message>
Added code to extract text and insert
</commit_message>
<xml_diff>
--- a/new.pptx
+++ b/new.pptx
@@ -5,9 +5,9 @@
     <p:sldMasterId id="2147483648" r:id="rId1"/>
   </p:sldMasterIdLst>
   <p:sldIdLst>
-    <p:sldId id="256" r:id="rId-af47cd85-7e60-4833-8ea7-45f0261affa5"/>
+    <p:sldId id="256" r:id="rId-f2e06b18-53ef-4e75-aecf-4299344fb75b"/>
   </p:sldIdLst>
-  <p:sldSz cx="10515600" cy="8686800" type="screen4x3"/>
+  <p:sldSz cx="10515600" cy="9144000" type="screen4x3"/>
   <p:notesSz cx="6858000" cy="9144000"/>
   <p:defaultTextStyle>
     <a:defPPr>
@@ -1034,8 +1034,300 @@
         </p:nvSpPr>
         <p:spPr>
           <a:xfrm>
-            <a:off x="2514600" y="4165600"/>
-            <a:ext cx="177800" cy="203200"/>
+            <a:off x="6578600" y="3924300"/>
+            <a:ext cx="774700" cy="584200"/>
+          </a:xfrm>
+          <a:prstGeom prst="rect">
+            <a:avLst/>
+          </a:prstGeom>
+          <a:solidFill>
+            <a:srgbClr val="ffffff"/>
+          </a:solidFill>
+          <a:ln w="25400">
+            <a:solidFill>
+              <a:srgbClr val="000000"/>
+            </a:solidFill>
+          </a:ln>
+        </p:spPr>
+        <p:txBody>
+          <a:bodyPr rtlCol="0" wrap="square" anchor="ctr"/>
+          <a:lstStyle/>
+          <a:p/>
+        </p:txBody>
+      </p:sp>
+      <p:sp>
+        <p:nvSpPr>
+          <p:cNvPr id="12" name="Shape 12"/>
+          <p:cNvSpPr/>
+          <p:nvPr/>
+        </p:nvSpPr>
+        <p:spPr>
+          <a:xfrm>
+            <a:off x="6565900" y="3911600"/>
+            <a:ext cx="800100" cy="609600"/>
+          </a:xfrm>
+          <a:prstGeom prst="octagon">
+            <a:avLst>
+              <a:gd name="adj" fmla="val 29289"/>
+            </a:avLst>
+          </a:prstGeom>
+          <a:solidFill>
+            <a:srgbClr val="ffffff"/>
+          </a:solidFill>
+          <a:ln w="25400">
+            <a:solidFill>
+              <a:srgbClr val="000000"/>
+            </a:solidFill>
+          </a:ln>
+        </p:spPr>
+        <p:txBody>
+          <a:bodyPr rtlCol="0" wrap="square" anchor="ctr"/>
+          <a:lstStyle/>
+          <a:p/>
+        </p:txBody>
+      </p:sp>
+      <p:sp>
+        <p:nvSpPr>
+          <p:cNvPr id="13" name="Shape 13"/>
+          <p:cNvSpPr/>
+          <p:nvPr/>
+        </p:nvSpPr>
+        <p:spPr>
+          <a:xfrm>
+            <a:off x="50800" y="3505200"/>
+            <a:ext cx="1981200" cy="1612900"/>
+          </a:xfrm>
+          <a:prstGeom prst="rect">
+            <a:avLst/>
+          </a:prstGeom>
+          <a:solidFill>
+            <a:srgbClr val="ffffff"/>
+          </a:solidFill>
+          <a:ln w="25400">
+            <a:solidFill>
+              <a:srgbClr val="000000"/>
+            </a:solidFill>
+          </a:ln>
+        </p:spPr>
+        <p:txBody>
+          <a:bodyPr rtlCol="0" wrap="square" anchor="ctr"/>
+          <a:lstStyle/>
+          <a:p/>
+        </p:txBody>
+      </p:sp>
+      <p:sp>
+        <p:nvSpPr>
+          <p:cNvPr id="14" name="Shape 14"/>
+          <p:cNvSpPr/>
+          <p:nvPr/>
+        </p:nvSpPr>
+        <p:spPr>
+          <a:xfrm>
+            <a:off x="63500" y="4572000"/>
+            <a:ext cx="1955800" cy="533400"/>
+          </a:xfrm>
+          <a:prstGeom prst="rect">
+            <a:avLst/>
+          </a:prstGeom>
+          <a:solidFill>
+            <a:srgbClr val="ffffff"/>
+          </a:solidFill>
+          <a:ln w="25400">
+            <a:solidFill>
+              <a:srgbClr val="000000"/>
+            </a:solidFill>
+          </a:ln>
+        </p:spPr>
+        <p:txBody>
+          <a:bodyPr rtlCol="0" wrap="square" anchor="ctr"/>
+          <a:lstStyle/>
+          <a:p/>
+        </p:txBody>
+      </p:sp>
+      <p:sp>
+        <p:nvSpPr>
+          <p:cNvPr id="15" name="Shape 15"/>
+          <p:cNvSpPr/>
+          <p:nvPr/>
+        </p:nvSpPr>
+        <p:spPr>
+          <a:xfrm>
+            <a:off x="63500" y="4051300"/>
+            <a:ext cx="1955800" cy="520700"/>
+          </a:xfrm>
+          <a:prstGeom prst="rect">
+            <a:avLst/>
+          </a:prstGeom>
+          <a:solidFill>
+            <a:srgbClr val="ffffff"/>
+          </a:solidFill>
+          <a:ln w="25400">
+            <a:solidFill>
+              <a:srgbClr val="000000"/>
+            </a:solidFill>
+          </a:ln>
+        </p:spPr>
+        <p:txBody>
+          <a:bodyPr rtlCol="0" wrap="square" anchor="ctr"/>
+          <a:lstStyle/>
+          <a:p/>
+        </p:txBody>
+      </p:sp>
+      <p:sp>
+        <p:nvSpPr>
+          <p:cNvPr id="16" name="Shape 16"/>
+          <p:cNvSpPr/>
+          <p:nvPr/>
+        </p:nvSpPr>
+        <p:spPr>
+          <a:xfrm>
+            <a:off x="63500" y="3517900"/>
+            <a:ext cx="1955800" cy="520700"/>
+          </a:xfrm>
+          <a:prstGeom prst="rect">
+            <a:avLst/>
+          </a:prstGeom>
+          <a:solidFill>
+            <a:srgbClr val="ffffff"/>
+          </a:solidFill>
+          <a:ln w="25400">
+            <a:solidFill>
+              <a:srgbClr val="000000"/>
+            </a:solidFill>
+          </a:ln>
+        </p:spPr>
+        <p:txBody>
+          <a:bodyPr rtlCol="0" wrap="square" anchor="ctr"/>
+          <a:lstStyle/>
+          <a:p/>
+        </p:txBody>
+      </p:sp>
+      <p:sp>
+        <p:nvSpPr>
+          <p:cNvPr id="17" name="Shape 17"/>
+          <p:cNvSpPr/>
+          <p:nvPr/>
+        </p:nvSpPr>
+        <p:spPr>
+          <a:xfrm>
+            <a:off x="7632700" y="3225800"/>
+            <a:ext cx="1981200" cy="1612900"/>
+          </a:xfrm>
+          <a:prstGeom prst="rect">
+            <a:avLst/>
+          </a:prstGeom>
+          <a:solidFill>
+            <a:srgbClr val="ffffff"/>
+          </a:solidFill>
+          <a:ln w="25400">
+            <a:solidFill>
+              <a:srgbClr val="000000"/>
+            </a:solidFill>
+          </a:ln>
+        </p:spPr>
+        <p:txBody>
+          <a:bodyPr rtlCol="0" wrap="square" anchor="ctr"/>
+          <a:lstStyle/>
+          <a:p/>
+        </p:txBody>
+      </p:sp>
+      <p:sp>
+        <p:nvSpPr>
+          <p:cNvPr id="18" name="Shape 18"/>
+          <p:cNvSpPr/>
+          <p:nvPr/>
+        </p:nvSpPr>
+        <p:spPr>
+          <a:xfrm>
+            <a:off x="7645400" y="4292600"/>
+            <a:ext cx="1955800" cy="533400"/>
+          </a:xfrm>
+          <a:prstGeom prst="rect">
+            <a:avLst/>
+          </a:prstGeom>
+          <a:solidFill>
+            <a:srgbClr val="ffffff"/>
+          </a:solidFill>
+          <a:ln w="25400">
+            <a:solidFill>
+              <a:srgbClr val="000000"/>
+            </a:solidFill>
+          </a:ln>
+        </p:spPr>
+        <p:txBody>
+          <a:bodyPr rtlCol="0" wrap="square" anchor="ctr"/>
+          <a:lstStyle/>
+          <a:p/>
+        </p:txBody>
+      </p:sp>
+      <p:sp>
+        <p:nvSpPr>
+          <p:cNvPr id="19" name="Shape 19"/>
+          <p:cNvSpPr/>
+          <p:nvPr/>
+        </p:nvSpPr>
+        <p:spPr>
+          <a:xfrm>
+            <a:off x="7645400" y="3771900"/>
+            <a:ext cx="1955800" cy="520700"/>
+          </a:xfrm>
+          <a:prstGeom prst="rect">
+            <a:avLst/>
+          </a:prstGeom>
+          <a:solidFill>
+            <a:srgbClr val="ffffff"/>
+          </a:solidFill>
+          <a:ln w="25400">
+            <a:solidFill>
+              <a:srgbClr val="000000"/>
+            </a:solidFill>
+          </a:ln>
+        </p:spPr>
+        <p:txBody>
+          <a:bodyPr rtlCol="0" wrap="square" anchor="ctr"/>
+          <a:lstStyle/>
+          <a:p/>
+        </p:txBody>
+      </p:sp>
+      <p:sp>
+        <p:nvSpPr>
+          <p:cNvPr id="20" name="Shape 20"/>
+          <p:cNvSpPr/>
+          <p:nvPr/>
+        </p:nvSpPr>
+        <p:spPr>
+          <a:xfrm>
+            <a:off x="7645400" y="3238500"/>
+            <a:ext cx="1955800" cy="520700"/>
+          </a:xfrm>
+          <a:prstGeom prst="rect">
+            <a:avLst/>
+          </a:prstGeom>
+          <a:solidFill>
+            <a:srgbClr val="ffffff"/>
+          </a:solidFill>
+          <a:ln w="25400">
+            <a:solidFill>
+              <a:srgbClr val="000000"/>
+            </a:solidFill>
+          </a:ln>
+        </p:spPr>
+        <p:txBody>
+          <a:bodyPr rtlCol="0" wrap="square" anchor="ctr"/>
+          <a:lstStyle/>
+          <a:p/>
+        </p:txBody>
+      </p:sp>
+      <p:sp>
+        <p:nvSpPr>
+          <p:cNvPr id="21" name="Shape 21"/>
+          <p:cNvSpPr/>
+          <p:nvPr/>
+        </p:nvSpPr>
+        <p:spPr>
+          <a:xfrm>
+            <a:off x="2832100" y="2667000"/>
+            <a:ext cx="1181100" cy="1193800"/>
           </a:xfrm>
           <a:prstGeom prst="hexagon">
             <a:avLst>
@@ -1060,306 +1352,14 @@
       </p:sp>
       <p:sp>
         <p:nvSpPr>
-          <p:cNvPr id="12" name="Shape 12"/>
-          <p:cNvSpPr/>
-          <p:nvPr/>
-        </p:nvSpPr>
-        <p:spPr>
-          <a:xfrm>
-            <a:off x="6578600" y="3924300"/>
-            <a:ext cx="774700" cy="584200"/>
-          </a:xfrm>
-          <a:prstGeom prst="rect">
-            <a:avLst/>
-          </a:prstGeom>
-          <a:solidFill>
-            <a:srgbClr val="ffffff"/>
-          </a:solidFill>
-          <a:ln w="25400">
-            <a:solidFill>
-              <a:srgbClr val="000000"/>
-            </a:solidFill>
-          </a:ln>
-        </p:spPr>
-        <p:txBody>
-          <a:bodyPr rtlCol="0" wrap="square" anchor="ctr"/>
-          <a:lstStyle/>
-          <a:p/>
-        </p:txBody>
-      </p:sp>
-      <p:sp>
-        <p:nvSpPr>
-          <p:cNvPr id="13" name="Shape 13"/>
-          <p:cNvSpPr/>
-          <p:nvPr/>
-        </p:nvSpPr>
-        <p:spPr>
-          <a:xfrm>
-            <a:off x="6565900" y="3911600"/>
-            <a:ext cx="800100" cy="609600"/>
-          </a:xfrm>
-          <a:prstGeom prst="octagon">
-            <a:avLst>
-              <a:gd name="adj" fmla="val 29289"/>
-            </a:avLst>
-          </a:prstGeom>
-          <a:solidFill>
-            <a:srgbClr val="ffffff"/>
-          </a:solidFill>
-          <a:ln w="25400">
-            <a:solidFill>
-              <a:srgbClr val="000000"/>
-            </a:solidFill>
-          </a:ln>
-        </p:spPr>
-        <p:txBody>
-          <a:bodyPr rtlCol="0" wrap="square" anchor="ctr"/>
-          <a:lstStyle/>
-          <a:p/>
-        </p:txBody>
-      </p:sp>
-      <p:sp>
-        <p:nvSpPr>
-          <p:cNvPr id="14" name="Shape 14"/>
-          <p:cNvSpPr/>
-          <p:nvPr/>
-        </p:nvSpPr>
-        <p:spPr>
-          <a:xfrm>
-            <a:off x="50800" y="3505200"/>
-            <a:ext cx="1981200" cy="1612900"/>
-          </a:xfrm>
-          <a:prstGeom prst="rect">
-            <a:avLst/>
-          </a:prstGeom>
-          <a:solidFill>
-            <a:srgbClr val="ffffff"/>
-          </a:solidFill>
-          <a:ln w="25400">
-            <a:solidFill>
-              <a:srgbClr val="000000"/>
-            </a:solidFill>
-          </a:ln>
-        </p:spPr>
-        <p:txBody>
-          <a:bodyPr rtlCol="0" wrap="square" anchor="ctr"/>
-          <a:lstStyle/>
-          <a:p/>
-        </p:txBody>
-      </p:sp>
-      <p:sp>
-        <p:nvSpPr>
-          <p:cNvPr id="15" name="Shape 15"/>
-          <p:cNvSpPr/>
-          <p:nvPr/>
-        </p:nvSpPr>
-        <p:spPr>
-          <a:xfrm>
-            <a:off x="63500" y="4572000"/>
-            <a:ext cx="1955800" cy="533400"/>
-          </a:xfrm>
-          <a:prstGeom prst="rect">
-            <a:avLst/>
-          </a:prstGeom>
-          <a:solidFill>
-            <a:srgbClr val="ffffff"/>
-          </a:solidFill>
-          <a:ln w="25400">
-            <a:solidFill>
-              <a:srgbClr val="000000"/>
-            </a:solidFill>
-          </a:ln>
-        </p:spPr>
-        <p:txBody>
-          <a:bodyPr rtlCol="0" wrap="square" anchor="ctr"/>
-          <a:lstStyle/>
-          <a:p/>
-        </p:txBody>
-      </p:sp>
-      <p:sp>
-        <p:nvSpPr>
-          <p:cNvPr id="16" name="Shape 16"/>
-          <p:cNvSpPr/>
-          <p:nvPr/>
-        </p:nvSpPr>
-        <p:spPr>
-          <a:xfrm>
-            <a:off x="63500" y="4051300"/>
-            <a:ext cx="1955800" cy="520700"/>
-          </a:xfrm>
-          <a:prstGeom prst="rect">
-            <a:avLst/>
-          </a:prstGeom>
-          <a:solidFill>
-            <a:srgbClr val="ffffff"/>
-          </a:solidFill>
-          <a:ln w="25400">
-            <a:solidFill>
-              <a:srgbClr val="000000"/>
-            </a:solidFill>
-          </a:ln>
-        </p:spPr>
-        <p:txBody>
-          <a:bodyPr rtlCol="0" wrap="square" anchor="ctr"/>
-          <a:lstStyle/>
-          <a:p/>
-        </p:txBody>
-      </p:sp>
-      <p:sp>
-        <p:nvSpPr>
-          <p:cNvPr id="17" name="Shape 17"/>
-          <p:cNvSpPr/>
-          <p:nvPr/>
-        </p:nvSpPr>
-        <p:spPr>
-          <a:xfrm>
-            <a:off x="63500" y="3517900"/>
-            <a:ext cx="1955800" cy="520700"/>
-          </a:xfrm>
-          <a:prstGeom prst="rect">
-            <a:avLst/>
-          </a:prstGeom>
-          <a:solidFill>
-            <a:srgbClr val="ffffff"/>
-          </a:solidFill>
-          <a:ln w="25400">
-            <a:solidFill>
-              <a:srgbClr val="000000"/>
-            </a:solidFill>
-          </a:ln>
-        </p:spPr>
-        <p:txBody>
-          <a:bodyPr rtlCol="0" wrap="square" anchor="ctr"/>
-          <a:lstStyle/>
-          <a:p/>
-        </p:txBody>
-      </p:sp>
-      <p:sp>
-        <p:nvSpPr>
-          <p:cNvPr id="18" name="Shape 18"/>
-          <p:cNvSpPr/>
-          <p:nvPr/>
-        </p:nvSpPr>
-        <p:spPr>
-          <a:xfrm>
-            <a:off x="7632700" y="3225800"/>
-            <a:ext cx="1981200" cy="1612900"/>
-          </a:xfrm>
-          <a:prstGeom prst="rect">
-            <a:avLst/>
-          </a:prstGeom>
-          <a:solidFill>
-            <a:srgbClr val="ffffff"/>
-          </a:solidFill>
-          <a:ln w="25400">
-            <a:solidFill>
-              <a:srgbClr val="000000"/>
-            </a:solidFill>
-          </a:ln>
-        </p:spPr>
-        <p:txBody>
-          <a:bodyPr rtlCol="0" wrap="square" anchor="ctr"/>
-          <a:lstStyle/>
-          <a:p/>
-        </p:txBody>
-      </p:sp>
-      <p:sp>
-        <p:nvSpPr>
-          <p:cNvPr id="19" name="Shape 19"/>
-          <p:cNvSpPr/>
-          <p:nvPr/>
-        </p:nvSpPr>
-        <p:spPr>
-          <a:xfrm>
-            <a:off x="7645400" y="4292600"/>
-            <a:ext cx="1955800" cy="533400"/>
-          </a:xfrm>
-          <a:prstGeom prst="rect">
-            <a:avLst/>
-          </a:prstGeom>
-          <a:solidFill>
-            <a:srgbClr val="ffffff"/>
-          </a:solidFill>
-          <a:ln w="25400">
-            <a:solidFill>
-              <a:srgbClr val="000000"/>
-            </a:solidFill>
-          </a:ln>
-        </p:spPr>
-        <p:txBody>
-          <a:bodyPr rtlCol="0" wrap="square" anchor="ctr"/>
-          <a:lstStyle/>
-          <a:p/>
-        </p:txBody>
-      </p:sp>
-      <p:sp>
-        <p:nvSpPr>
-          <p:cNvPr id="20" name="Shape 20"/>
-          <p:cNvSpPr/>
-          <p:nvPr/>
-        </p:nvSpPr>
-        <p:spPr>
-          <a:xfrm>
-            <a:off x="7645400" y="3771900"/>
-            <a:ext cx="1955800" cy="520700"/>
-          </a:xfrm>
-          <a:prstGeom prst="rect">
-            <a:avLst/>
-          </a:prstGeom>
-          <a:solidFill>
-            <a:srgbClr val="ffffff"/>
-          </a:solidFill>
-          <a:ln w="25400">
-            <a:solidFill>
-              <a:srgbClr val="000000"/>
-            </a:solidFill>
-          </a:ln>
-        </p:spPr>
-        <p:txBody>
-          <a:bodyPr rtlCol="0" wrap="square" anchor="ctr"/>
-          <a:lstStyle/>
-          <a:p/>
-        </p:txBody>
-      </p:sp>
-      <p:sp>
-        <p:nvSpPr>
-          <p:cNvPr id="21" name="Shape 21"/>
-          <p:cNvSpPr/>
-          <p:nvPr/>
-        </p:nvSpPr>
-        <p:spPr>
-          <a:xfrm>
-            <a:off x="7645400" y="3238500"/>
-            <a:ext cx="1955800" cy="520700"/>
-          </a:xfrm>
-          <a:prstGeom prst="rect">
-            <a:avLst/>
-          </a:prstGeom>
-          <a:solidFill>
-            <a:srgbClr val="ffffff"/>
-          </a:solidFill>
-          <a:ln w="25400">
-            <a:solidFill>
-              <a:srgbClr val="000000"/>
-            </a:solidFill>
-          </a:ln>
-        </p:spPr>
-        <p:txBody>
-          <a:bodyPr rtlCol="0" wrap="square" anchor="ctr"/>
-          <a:lstStyle/>
-          <a:p/>
-        </p:txBody>
-      </p:sp>
-      <p:sp>
-        <p:nvSpPr>
           <p:cNvPr id="22" name="Shape 22"/>
           <p:cNvSpPr/>
           <p:nvPr/>
         </p:nvSpPr>
         <p:spPr>
           <a:xfrm>
-            <a:off x="2832100" y="2667000"/>
-            <a:ext cx="1181100" cy="1193800"/>
+            <a:off x="5245100" y="2552700"/>
+            <a:ext cx="1460500" cy="1244600"/>
           </a:xfrm>
           <a:prstGeom prst="hexagon">
             <a:avLst>
@@ -1390,38 +1390,6 @@
         </p:nvSpPr>
         <p:spPr>
           <a:xfrm>
-            <a:off x="5245100" y="2552700"/>
-            <a:ext cx="1460500" cy="1244600"/>
-          </a:xfrm>
-          <a:prstGeom prst="hexagon">
-            <a:avLst>
-              <a:gd name="adj" fmla="val 25000"/>
-              <a:gd name="vf" fmla="val 115470"/>
-            </a:avLst>
-          </a:prstGeom>
-          <a:solidFill>
-            <a:srgbClr val="ffffff"/>
-          </a:solidFill>
-          <a:ln w="25400">
-            <a:solidFill>
-              <a:srgbClr val="000000"/>
-            </a:solidFill>
-          </a:ln>
-        </p:spPr>
-        <p:txBody>
-          <a:bodyPr rtlCol="0" wrap="square" anchor="ctr"/>
-          <a:lstStyle/>
-          <a:p/>
-        </p:txBody>
-      </p:sp>
-      <p:sp>
-        <p:nvSpPr>
-          <p:cNvPr id="24" name="Shape 24"/>
-          <p:cNvSpPr/>
-          <p:nvPr/>
-        </p:nvSpPr>
-        <p:spPr>
-          <a:xfrm>
             <a:off x="4330700" y="2133600"/>
             <a:ext cx="774700" cy="584200"/>
           </a:xfrm>
@@ -1445,7 +1413,7 @@
       </p:sp>
       <p:sp>
         <p:nvSpPr>
-          <p:cNvPr id="25" name="Shape 25"/>
+          <p:cNvPr id="24" name="Shape 24"/>
           <p:cNvSpPr/>
           <p:nvPr/>
         </p:nvSpPr>
@@ -1476,7 +1444,7 @@
       </p:sp>
       <p:sp>
         <p:nvSpPr>
-          <p:cNvPr id="26" name="Shape 26"/>
+          <p:cNvPr id="25" name="Shape 25"/>
           <p:cNvSpPr/>
           <p:nvPr/>
         </p:nvSpPr>
@@ -1505,7 +1473,7 @@
       </p:sp>
       <p:sp>
         <p:nvSpPr>
-          <p:cNvPr id="27" name="Shape 27"/>
+          <p:cNvPr id="26" name="Shape 26"/>
           <p:cNvSpPr/>
           <p:nvPr/>
         </p:nvSpPr>
@@ -1534,7 +1502,7 @@
       </p:sp>
       <p:sp>
         <p:nvSpPr>
-          <p:cNvPr id="28" name="Shape 28"/>
+          <p:cNvPr id="27" name="Shape 27"/>
           <p:cNvSpPr/>
           <p:nvPr/>
         </p:nvSpPr>
@@ -1563,7 +1531,7 @@
       </p:sp>
       <p:sp>
         <p:nvSpPr>
-          <p:cNvPr id="29" name="Shape 29"/>
+          <p:cNvPr id="28" name="Shape 28"/>
           <p:cNvSpPr/>
           <p:nvPr/>
         </p:nvSpPr>
@@ -1588,6 +1556,754 @@
           <a:bodyPr rtlCol="0" wrap="square" anchor="ctr"/>
           <a:lstStyle/>
           <a:p/>
+        </p:txBody>
+      </p:sp>
+      <p:sp>
+        <p:nvSpPr>
+          <p:cNvPr id="1" name="Text 1"/>
+          <p:cNvSpPr txBox="1"/>
+          <p:nvPr/>
+        </p:nvSpPr>
+        <p:spPr>
+          <a:xfrm>
+            <a:off x="3937000" y="0"/>
+            <a:ext cx="2540000" cy="381000"/>
+          </a:xfrm>
+          <a:prstGeom prst="rect">
+            <a:avLst/>
+          </a:prstGeom>
+          <a:noFill/>
+        </p:spPr>
+        <p:txBody>
+          <a:bodyPr rtlCol="0" wrap="none" anchor="ctr"/>
+          <a:lstStyle/>
+          <a:p>
+            <a:pPr algn="ctr"/>
+            <a:r>
+              <a:rPr lang="en-US" smtClean="0" sz="2000">
+                <a:solidFill>
+                  <a:srgbClr val="000000"/>
+                </a:solidFill>
+                <a:latin typeface="Alien Encounters" pitchFamily="0" charset="0"/>
+                <a:cs typeface="Alien Encounters" pitchFamily="0" charset="0"/>
+              </a:rPr>
+              <a:t>Ledger of Node A</a:t>
+            </a:r>
+          </a:p>
+        </p:txBody>
+      </p:sp>
+      <p:sp>
+        <p:nvSpPr>
+          <p:cNvPr id="2" name="Text 2"/>
+          <p:cNvSpPr txBox="1"/>
+          <p:nvPr/>
+        </p:nvSpPr>
+        <p:spPr>
+          <a:xfrm>
+            <a:off x="4140200" y="533400"/>
+            <a:ext cx="2540000" cy="381000"/>
+          </a:xfrm>
+          <a:prstGeom prst="rect">
+            <a:avLst/>
+          </a:prstGeom>
+          <a:noFill/>
+        </p:spPr>
+        <p:txBody>
+          <a:bodyPr rtlCol="0" wrap="none" anchor="ctr"/>
+          <a:lstStyle/>
+          <a:p>
+            <a:pPr algn="ctr"/>
+            <a:r>
+              <a:rPr lang="en-US" smtClean="0" sz="2000">
+                <a:solidFill>
+                  <a:srgbClr val="000000"/>
+                </a:solidFill>
+                <a:latin typeface="Alien Encounters" pitchFamily="0" charset="0"/>
+                <a:cs typeface="Alien Encounters" pitchFamily="0" charset="0"/>
+              </a:rPr>
+              <a:t>Transaction 1</a:t>
+            </a:r>
+          </a:p>
+        </p:txBody>
+      </p:sp>
+      <p:sp>
+        <p:nvSpPr>
+          <p:cNvPr id="3" name="Text 3"/>
+          <p:cNvSpPr txBox="1"/>
+          <p:nvPr/>
+        </p:nvSpPr>
+        <p:spPr>
+          <a:xfrm>
+            <a:off x="4127500" y="1054100"/>
+            <a:ext cx="2540000" cy="381000"/>
+          </a:xfrm>
+          <a:prstGeom prst="rect">
+            <a:avLst/>
+          </a:prstGeom>
+          <a:noFill/>
+        </p:spPr>
+        <p:txBody>
+          <a:bodyPr rtlCol="0" wrap="none" anchor="ctr"/>
+          <a:lstStyle/>
+          <a:p>
+            <a:pPr algn="ctr"/>
+            <a:r>
+              <a:rPr lang="en-US" smtClean="0" sz="2000">
+                <a:solidFill>
+                  <a:srgbClr val="000000"/>
+                </a:solidFill>
+                <a:latin typeface="Alien Encounters" pitchFamily="0" charset="0"/>
+                <a:cs typeface="Alien Encounters" pitchFamily="0" charset="0"/>
+              </a:rPr>
+              <a:t>Transaction 2</a:t>
+            </a:r>
+          </a:p>
+        </p:txBody>
+      </p:sp>
+      <p:sp>
+        <p:nvSpPr>
+          <p:cNvPr id="4" name="Text 4"/>
+          <p:cNvSpPr txBox="1"/>
+          <p:nvPr/>
+        </p:nvSpPr>
+        <p:spPr>
+          <a:xfrm>
+            <a:off x="4127500" y="1562100"/>
+            <a:ext cx="2540000" cy="381000"/>
+          </a:xfrm>
+          <a:prstGeom prst="rect">
+            <a:avLst/>
+          </a:prstGeom>
+          <a:noFill/>
+        </p:spPr>
+        <p:txBody>
+          <a:bodyPr rtlCol="0" wrap="none" anchor="ctr"/>
+          <a:lstStyle/>
+          <a:p>
+            <a:pPr algn="ctr"/>
+            <a:r>
+              <a:rPr lang="en-US" smtClean="0" sz="2000">
+                <a:solidFill>
+                  <a:srgbClr val="000000"/>
+                </a:solidFill>
+                <a:latin typeface="Alien Encounters" pitchFamily="0" charset="0"/>
+                <a:cs typeface="Alien Encounters" pitchFamily="0" charset="0"/>
+              </a:rPr>
+              <a:t>Transaction 3</a:t>
+            </a:r>
+          </a:p>
+        </p:txBody>
+      </p:sp>
+      <p:sp>
+        <p:nvSpPr>
+          <p:cNvPr id="5" name="Text 5"/>
+          <p:cNvSpPr txBox="1"/>
+          <p:nvPr/>
+        </p:nvSpPr>
+        <p:spPr>
+          <a:xfrm>
+            <a:off x="6184900" y="2374900"/>
+            <a:ext cx="2540000" cy="381000"/>
+          </a:xfrm>
+          <a:prstGeom prst="rect">
+            <a:avLst/>
+          </a:prstGeom>
+          <a:noFill/>
+        </p:spPr>
+        <p:txBody>
+          <a:bodyPr rtlCol="0" wrap="none" anchor="ctr"/>
+          <a:lstStyle/>
+          <a:p>
+            <a:pPr algn="ctr"/>
+            <a:r>
+              <a:rPr lang="en-US" smtClean="0" sz="2000">
+                <a:solidFill>
+                  <a:srgbClr val="000000"/>
+                </a:solidFill>
+                <a:latin typeface="Alien Encounters" pitchFamily="0" charset="0"/>
+                <a:cs typeface="Alien Encounters" pitchFamily="0" charset="0"/>
+              </a:rPr>
+              <a:t>Transaction 1</a:t>
+            </a:r>
+          </a:p>
+        </p:txBody>
+      </p:sp>
+      <p:sp>
+        <p:nvSpPr>
+          <p:cNvPr id="6" name="Text 6"/>
+          <p:cNvSpPr txBox="1"/>
+          <p:nvPr/>
+        </p:nvSpPr>
+        <p:spPr>
+          <a:xfrm>
+            <a:off x="6210300" y="2705100"/>
+            <a:ext cx="2540000" cy="381000"/>
+          </a:xfrm>
+          <a:prstGeom prst="rect">
+            <a:avLst/>
+          </a:prstGeom>
+          <a:noFill/>
+        </p:spPr>
+        <p:txBody>
+          <a:bodyPr rtlCol="0" wrap="none" anchor="ctr"/>
+          <a:lstStyle/>
+          <a:p>
+            <a:pPr algn="ctr"/>
+            <a:r>
+              <a:rPr lang="en-US" smtClean="0" sz="2000">
+                <a:solidFill>
+                  <a:srgbClr val="000000"/>
+                </a:solidFill>
+                <a:latin typeface="Alien Encounters" pitchFamily="0" charset="0"/>
+                <a:cs typeface="Alien Encounters" pitchFamily="0" charset="0"/>
+              </a:rPr>
+              <a:t>A send E5 to B</a:t>
+            </a:r>
+          </a:p>
+        </p:txBody>
+      </p:sp>
+      <p:sp>
+        <p:nvSpPr>
+          <p:cNvPr id="7" name="Text 7"/>
+          <p:cNvSpPr txBox="1"/>
+          <p:nvPr/>
+        </p:nvSpPr>
+        <p:spPr>
+          <a:xfrm>
+            <a:off x="7912100" y="3390900"/>
+            <a:ext cx="2540000" cy="381000"/>
+          </a:xfrm>
+          <a:prstGeom prst="rect">
+            <a:avLst/>
+          </a:prstGeom>
+          <a:noFill/>
+        </p:spPr>
+        <p:txBody>
+          <a:bodyPr rtlCol="0" wrap="none" anchor="ctr"/>
+          <a:lstStyle/>
+          <a:p>
+            <a:pPr algn="ctr"/>
+            <a:r>
+              <a:rPr lang="en-US" smtClean="0" sz="2000">
+                <a:solidFill>
+                  <a:srgbClr val="000000"/>
+                </a:solidFill>
+                <a:latin typeface="Alien Encounters" pitchFamily="0" charset="0"/>
+                <a:cs typeface="Alien Encounters" pitchFamily="0" charset="0"/>
+              </a:rPr>
+              <a:t>Transaction 1</a:t>
+            </a:r>
+          </a:p>
+        </p:txBody>
+      </p:sp>
+      <p:sp>
+        <p:nvSpPr>
+          <p:cNvPr id="8" name="Text 8"/>
+          <p:cNvSpPr txBox="1"/>
+          <p:nvPr/>
+        </p:nvSpPr>
+        <p:spPr>
+          <a:xfrm>
+            <a:off x="292100" y="3670300"/>
+            <a:ext cx="2540000" cy="381000"/>
+          </a:xfrm>
+          <a:prstGeom prst="rect">
+            <a:avLst/>
+          </a:prstGeom>
+          <a:noFill/>
+        </p:spPr>
+        <p:txBody>
+          <a:bodyPr rtlCol="0" wrap="none" anchor="ctr"/>
+          <a:lstStyle/>
+          <a:p>
+            <a:pPr algn="ctr"/>
+            <a:r>
+              <a:rPr lang="en-US" smtClean="0" sz="2000">
+                <a:solidFill>
+                  <a:srgbClr val="000000"/>
+                </a:solidFill>
+                <a:latin typeface="Alien Encounters" pitchFamily="0" charset="0"/>
+                <a:cs typeface="Alien Encounters" pitchFamily="0" charset="0"/>
+              </a:rPr>
+              <a:t>Transaction 1</a:t>
+            </a:r>
+          </a:p>
+        </p:txBody>
+      </p:sp>
+      <p:sp>
+        <p:nvSpPr>
+          <p:cNvPr id="9" name="Text 9"/>
+          <p:cNvSpPr txBox="1"/>
+          <p:nvPr/>
+        </p:nvSpPr>
+        <p:spPr>
+          <a:xfrm>
+            <a:off x="7937500" y="3924300"/>
+            <a:ext cx="2540000" cy="381000"/>
+          </a:xfrm>
+          <a:prstGeom prst="rect">
+            <a:avLst/>
+          </a:prstGeom>
+          <a:noFill/>
+        </p:spPr>
+        <p:txBody>
+          <a:bodyPr rtlCol="0" wrap="none" anchor="ctr"/>
+          <a:lstStyle/>
+          <a:p>
+            <a:pPr algn="ctr"/>
+            <a:r>
+              <a:rPr lang="en-US" smtClean="0" sz="2000">
+                <a:solidFill>
+                  <a:srgbClr val="000000"/>
+                </a:solidFill>
+                <a:latin typeface="Alien Encounters" pitchFamily="0" charset="0"/>
+                <a:cs typeface="Alien Encounters" pitchFamily="0" charset="0"/>
+              </a:rPr>
+              <a:t>Transaction 2</a:t>
+            </a:r>
+          </a:p>
+        </p:txBody>
+      </p:sp>
+      <p:sp>
+        <p:nvSpPr>
+          <p:cNvPr id="10" name="Text 10"/>
+          <p:cNvSpPr txBox="1"/>
+          <p:nvPr/>
+        </p:nvSpPr>
+        <p:spPr>
+          <a:xfrm>
+            <a:off x="254000" y="4152900"/>
+            <a:ext cx="2540000" cy="381000"/>
+          </a:xfrm>
+          <a:prstGeom prst="rect">
+            <a:avLst/>
+          </a:prstGeom>
+          <a:noFill/>
+        </p:spPr>
+        <p:txBody>
+          <a:bodyPr rtlCol="0" wrap="none" anchor="ctr"/>
+          <a:lstStyle/>
+          <a:p>
+            <a:pPr algn="ctr"/>
+            <a:r>
+              <a:rPr lang="en-US" smtClean="0" sz="2000">
+                <a:solidFill>
+                  <a:srgbClr val="000000"/>
+                </a:solidFill>
+                <a:latin typeface="Alien Encounters" pitchFamily="0" charset="0"/>
+                <a:cs typeface="Alien Encounters" pitchFamily="0" charset="0"/>
+              </a:rPr>
+              <a:t>Transaction 2</a:t>
+            </a:r>
+          </a:p>
+        </p:txBody>
+      </p:sp>
+      <p:sp>
+        <p:nvSpPr>
+          <p:cNvPr id="11" name="Text 11"/>
+          <p:cNvSpPr txBox="1"/>
+          <p:nvPr/>
+        </p:nvSpPr>
+        <p:spPr>
+          <a:xfrm>
+            <a:off x="7912100" y="4457700"/>
+            <a:ext cx="2540000" cy="381000"/>
+          </a:xfrm>
+          <a:prstGeom prst="rect">
+            <a:avLst/>
+          </a:prstGeom>
+          <a:noFill/>
+        </p:spPr>
+        <p:txBody>
+          <a:bodyPr rtlCol="0" wrap="none" anchor="ctr"/>
+          <a:lstStyle/>
+          <a:p>
+            <a:pPr algn="ctr"/>
+            <a:r>
+              <a:rPr lang="en-US" smtClean="0" sz="2000">
+                <a:solidFill>
+                  <a:srgbClr val="000000"/>
+                </a:solidFill>
+                <a:latin typeface="Alien Encounters" pitchFamily="0" charset="0"/>
+                <a:cs typeface="Alien Encounters" pitchFamily="0" charset="0"/>
+              </a:rPr>
+              <a:t>Transaction 3</a:t>
+            </a:r>
+          </a:p>
+        </p:txBody>
+      </p:sp>
+      <p:sp>
+        <p:nvSpPr>
+          <p:cNvPr id="12" name="Text 12"/>
+          <p:cNvSpPr txBox="1"/>
+          <p:nvPr/>
+        </p:nvSpPr>
+        <p:spPr>
+          <a:xfrm>
+            <a:off x="266700" y="4737100"/>
+            <a:ext cx="2540000" cy="381000"/>
+          </a:xfrm>
+          <a:prstGeom prst="rect">
+            <a:avLst/>
+          </a:prstGeom>
+          <a:noFill/>
+        </p:spPr>
+        <p:txBody>
+          <a:bodyPr rtlCol="0" wrap="none" anchor="ctr"/>
+          <a:lstStyle/>
+          <a:p>
+            <a:pPr algn="ctr"/>
+            <a:r>
+              <a:rPr lang="en-US" smtClean="0" sz="2000">
+                <a:solidFill>
+                  <a:srgbClr val="000000"/>
+                </a:solidFill>
+                <a:latin typeface="Alien Encounters" pitchFamily="0" charset="0"/>
+                <a:cs typeface="Alien Encounters" pitchFamily="0" charset="0"/>
+              </a:rPr>
+              <a:t>Transaction 3</a:t>
+            </a:r>
+          </a:p>
+        </p:txBody>
+      </p:sp>
+      <p:sp>
+        <p:nvSpPr>
+          <p:cNvPr id="13" name="Text 13"/>
+          <p:cNvSpPr txBox="1"/>
+          <p:nvPr/>
+        </p:nvSpPr>
+        <p:spPr>
+          <a:xfrm>
+            <a:off x="7670800" y="5130800"/>
+            <a:ext cx="2540000" cy="381000"/>
+          </a:xfrm>
+          <a:prstGeom prst="rect">
+            <a:avLst/>
+          </a:prstGeom>
+          <a:noFill/>
+        </p:spPr>
+        <p:txBody>
+          <a:bodyPr rtlCol="0" wrap="none" anchor="ctr"/>
+          <a:lstStyle/>
+          <a:p>
+            <a:pPr algn="ctr"/>
+            <a:r>
+              <a:rPr lang="en-US" smtClean="0" sz="2000">
+                <a:solidFill>
+                  <a:srgbClr val="000000"/>
+                </a:solidFill>
+                <a:latin typeface="Alien Encounters" pitchFamily="0" charset="0"/>
+                <a:cs typeface="Alien Encounters" pitchFamily="0" charset="0"/>
+              </a:rPr>
+              <a:t>Ledger of Node B</a:t>
+            </a:r>
+          </a:p>
+        </p:txBody>
+      </p:sp>
+      <p:sp>
+        <p:nvSpPr>
+          <p:cNvPr id="14" name="Text 14"/>
+          <p:cNvSpPr txBox="1"/>
+          <p:nvPr/>
+        </p:nvSpPr>
+        <p:spPr>
+          <a:xfrm>
+            <a:off x="25400" y="5359400"/>
+            <a:ext cx="2540000" cy="381000"/>
+          </a:xfrm>
+          <a:prstGeom prst="rect">
+            <a:avLst/>
+          </a:prstGeom>
+          <a:noFill/>
+        </p:spPr>
+        <p:txBody>
+          <a:bodyPr rtlCol="0" wrap="none" anchor="ctr"/>
+          <a:lstStyle/>
+          <a:p>
+            <a:pPr algn="ctr"/>
+            <a:r>
+              <a:rPr lang="en-US" smtClean="0" sz="2000">
+                <a:solidFill>
+                  <a:srgbClr val="000000"/>
+                </a:solidFill>
+                <a:latin typeface="Alien Encounters" pitchFamily="0" charset="0"/>
+                <a:cs typeface="Alien Encounters" pitchFamily="0" charset="0"/>
+              </a:rPr>
+              <a:t>Ledger of Node D</a:t>
+            </a:r>
+          </a:p>
+        </p:txBody>
+      </p:sp>
+      <p:sp>
+        <p:nvSpPr>
+          <p:cNvPr id="15" name="Text 15"/>
+          <p:cNvSpPr txBox="1"/>
+          <p:nvPr/>
+        </p:nvSpPr>
+        <p:spPr>
+          <a:xfrm>
+            <a:off x="6134100" y="5702300"/>
+            <a:ext cx="2540000" cy="381000"/>
+          </a:xfrm>
+          <a:prstGeom prst="rect">
+            <a:avLst/>
+          </a:prstGeom>
+          <a:noFill/>
+        </p:spPr>
+        <p:txBody>
+          <a:bodyPr rtlCol="0" wrap="none" anchor="ctr"/>
+          <a:lstStyle/>
+          <a:p>
+            <a:pPr algn="ctr"/>
+            <a:r>
+              <a:rPr lang="en-US" smtClean="0" sz="2000">
+                <a:solidFill>
+                  <a:srgbClr val="000000"/>
+                </a:solidFill>
+                <a:latin typeface="Alien Encounters" pitchFamily="0" charset="0"/>
+                <a:cs typeface="Alien Encounters" pitchFamily="0" charset="0"/>
+              </a:rPr>
+              <a:t>Transaction 2</a:t>
+            </a:r>
+          </a:p>
+        </p:txBody>
+      </p:sp>
+      <p:sp>
+        <p:nvSpPr>
+          <p:cNvPr id="16" name="Text 16"/>
+          <p:cNvSpPr txBox="1"/>
+          <p:nvPr/>
+        </p:nvSpPr>
+        <p:spPr>
+          <a:xfrm>
+            <a:off x="1676400" y="5905500"/>
+            <a:ext cx="2540000" cy="381000"/>
+          </a:xfrm>
+          <a:prstGeom prst="rect">
+            <a:avLst/>
+          </a:prstGeom>
+          <a:noFill/>
+        </p:spPr>
+        <p:txBody>
+          <a:bodyPr rtlCol="0" wrap="none" anchor="ctr"/>
+          <a:lstStyle/>
+          <a:p>
+            <a:pPr algn="ctr"/>
+            <a:r>
+              <a:rPr lang="en-US" smtClean="0" sz="2000">
+                <a:solidFill>
+                  <a:srgbClr val="000000"/>
+                </a:solidFill>
+                <a:latin typeface="Alien Encounters" pitchFamily="0" charset="0"/>
+                <a:cs typeface="Alien Encounters" pitchFamily="0" charset="0"/>
+              </a:rPr>
+              <a:t>Transaction 3</a:t>
+            </a:r>
+          </a:p>
+        </p:txBody>
+      </p:sp>
+      <p:sp>
+        <p:nvSpPr>
+          <p:cNvPr id="17" name="Text 17"/>
+          <p:cNvSpPr txBox="1"/>
+          <p:nvPr/>
+        </p:nvSpPr>
+        <p:spPr>
+          <a:xfrm>
+            <a:off x="6159500" y="6032500"/>
+            <a:ext cx="2540000" cy="381000"/>
+          </a:xfrm>
+          <a:prstGeom prst="rect">
+            <a:avLst/>
+          </a:prstGeom>
+          <a:noFill/>
+        </p:spPr>
+        <p:txBody>
+          <a:bodyPr rtlCol="0" wrap="none" anchor="ctr"/>
+          <a:lstStyle/>
+          <a:p>
+            <a:pPr algn="ctr"/>
+            <a:r>
+              <a:rPr lang="en-US" smtClean="0" sz="2000">
+                <a:solidFill>
+                  <a:srgbClr val="000000"/>
+                </a:solidFill>
+                <a:latin typeface="Alien Encounters" pitchFamily="0" charset="0"/>
+                <a:cs typeface="Alien Encounters" pitchFamily="0" charset="0"/>
+              </a:rPr>
+              <a:t>B send E10to C</a:t>
+            </a:r>
+          </a:p>
+        </p:txBody>
+      </p:sp>
+      <p:sp>
+        <p:nvSpPr>
+          <p:cNvPr id="18" name="Text 18"/>
+          <p:cNvSpPr txBox="1"/>
+          <p:nvPr/>
+        </p:nvSpPr>
+        <p:spPr>
+          <a:xfrm>
+            <a:off x="1854200" y="6210300"/>
+            <a:ext cx="2540000" cy="381000"/>
+          </a:xfrm>
+          <a:prstGeom prst="rect">
+            <a:avLst/>
+          </a:prstGeom>
+          <a:noFill/>
+        </p:spPr>
+        <p:txBody>
+          <a:bodyPr rtlCol="0" wrap="none" anchor="ctr"/>
+          <a:lstStyle/>
+          <a:p>
+            <a:pPr algn="ctr"/>
+            <a:r>
+              <a:rPr lang="en-US" smtClean="0" sz="2000">
+                <a:solidFill>
+                  <a:srgbClr val="000000"/>
+                </a:solidFill>
+                <a:latin typeface="Alien Encounters" pitchFamily="0" charset="0"/>
+                <a:cs typeface="Alien Encounters" pitchFamily="0" charset="0"/>
+              </a:rPr>
+              <a:t>send E20 to D</a:t>
+            </a:r>
+          </a:p>
+        </p:txBody>
+      </p:sp>
+      <p:sp>
+        <p:nvSpPr>
+          <p:cNvPr id="19" name="Text 19"/>
+          <p:cNvSpPr txBox="1"/>
+          <p:nvPr/>
+        </p:nvSpPr>
+        <p:spPr>
+          <a:xfrm>
+            <a:off x="3898900" y="6921500"/>
+            <a:ext cx="2540000" cy="381000"/>
+          </a:xfrm>
+          <a:prstGeom prst="rect">
+            <a:avLst/>
+          </a:prstGeom>
+          <a:noFill/>
+        </p:spPr>
+        <p:txBody>
+          <a:bodyPr rtlCol="0" wrap="none" anchor="ctr"/>
+          <a:lstStyle/>
+          <a:p>
+            <a:pPr algn="ctr"/>
+            <a:r>
+              <a:rPr lang="en-US" smtClean="0" sz="2000">
+                <a:solidFill>
+                  <a:srgbClr val="000000"/>
+                </a:solidFill>
+                <a:latin typeface="Alien Encounters" pitchFamily="0" charset="0"/>
+                <a:cs typeface="Alien Encounters" pitchFamily="0" charset="0"/>
+              </a:rPr>
+              <a:t>Transaction 1</a:t>
+            </a:r>
+          </a:p>
+        </p:txBody>
+      </p:sp>
+      <p:sp>
+        <p:nvSpPr>
+          <p:cNvPr id="20" name="Text 20"/>
+          <p:cNvSpPr txBox="1"/>
+          <p:nvPr/>
+        </p:nvSpPr>
+        <p:spPr>
+          <a:xfrm>
+            <a:off x="3898900" y="7454900"/>
+            <a:ext cx="2540000" cy="381000"/>
+          </a:xfrm>
+          <a:prstGeom prst="rect">
+            <a:avLst/>
+          </a:prstGeom>
+          <a:noFill/>
+        </p:spPr>
+        <p:txBody>
+          <a:bodyPr rtlCol="0" wrap="none" anchor="ctr"/>
+          <a:lstStyle/>
+          <a:p>
+            <a:pPr algn="ctr"/>
+            <a:r>
+              <a:rPr lang="en-US" smtClean="0" sz="2000">
+                <a:solidFill>
+                  <a:srgbClr val="000000"/>
+                </a:solidFill>
+                <a:latin typeface="Alien Encounters" pitchFamily="0" charset="0"/>
+                <a:cs typeface="Alien Encounters" pitchFamily="0" charset="0"/>
+              </a:rPr>
+              <a:t>Transaction 2</a:t>
+            </a:r>
+          </a:p>
+        </p:txBody>
+      </p:sp>
+      <p:sp>
+        <p:nvSpPr>
+          <p:cNvPr id="21" name="Text 21"/>
+          <p:cNvSpPr txBox="1"/>
+          <p:nvPr/>
+        </p:nvSpPr>
+        <p:spPr>
+          <a:xfrm>
+            <a:off x="3886200" y="7975600"/>
+            <a:ext cx="2540000" cy="381000"/>
+          </a:xfrm>
+          <a:prstGeom prst="rect">
+            <a:avLst/>
+          </a:prstGeom>
+          <a:noFill/>
+        </p:spPr>
+        <p:txBody>
+          <a:bodyPr rtlCol="0" wrap="none" anchor="ctr"/>
+          <a:lstStyle/>
+          <a:p>
+            <a:pPr algn="ctr"/>
+            <a:r>
+              <a:rPr lang="en-US" smtClean="0" sz="2000">
+                <a:solidFill>
+                  <a:srgbClr val="000000"/>
+                </a:solidFill>
+                <a:latin typeface="Alien Encounters" pitchFamily="0" charset="0"/>
+                <a:cs typeface="Alien Encounters" pitchFamily="0" charset="0"/>
+              </a:rPr>
+              <a:t>Transaction 3</a:t>
+            </a:r>
+          </a:p>
+        </p:txBody>
+      </p:sp>
+      <p:sp>
+        <p:nvSpPr>
+          <p:cNvPr id="22" name="Text 22"/>
+          <p:cNvSpPr txBox="1"/>
+          <p:nvPr/>
+        </p:nvSpPr>
+        <p:spPr>
+          <a:xfrm>
+            <a:off x="3632200" y="8585200"/>
+            <a:ext cx="2540000" cy="381000"/>
+          </a:xfrm>
+          <a:prstGeom prst="rect">
+            <a:avLst/>
+          </a:prstGeom>
+          <a:noFill/>
+        </p:spPr>
+        <p:txBody>
+          <a:bodyPr rtlCol="0" wrap="none" anchor="ctr"/>
+          <a:lstStyle/>
+          <a:p>
+            <a:pPr algn="ctr"/>
+            <a:r>
+              <a:rPr lang="en-US" smtClean="0" sz="2000">
+                <a:solidFill>
+                  <a:srgbClr val="000000"/>
+                </a:solidFill>
+                <a:latin typeface="Alien Encounters" pitchFamily="0" charset="0"/>
+                <a:cs typeface="Alien Encounters" pitchFamily="0" charset="0"/>
+              </a:rPr>
+              <a:t>Ledger of Node C</a:t>
+            </a:r>
+          </a:p>
         </p:txBody>
       </p:sp>
     </p:spTree>

</xml_diff>

<commit_message>
display message for progress levels
</commit_message>
<xml_diff>
--- a/new.pptx
+++ b/new.pptx
@@ -5,7 +5,7 @@
     <p:sldMasterId id="2147483648" r:id="rId1"/>
   </p:sldMasterIdLst>
   <p:sldIdLst>
-    <p:sldId id="256" r:id="rId-f2e06b18-53ef-4e75-aecf-4299344fb75b"/>
+    <p:sldId id="256" r:id="rId-dfdd234a-7264-4aa7-a4c1-03b81af0f200"/>
   </p:sldIdLst>
   <p:sldSz cx="10515600" cy="9144000" type="screen4x3"/>
   <p:notesSz cx="6858000" cy="9144000"/>
@@ -1578,7 +1578,7 @@
           <a:bodyPr rtlCol="0" wrap="none" anchor="ctr"/>
           <a:lstStyle/>
           <a:p>
-            <a:pPr algn="ctr"/>
+            <a:pPr algn="l"/>
             <a:r>
               <a:rPr lang="en-US" smtClean="0" sz="2000">
                 <a:solidFill>
@@ -1612,7 +1612,7 @@
           <a:bodyPr rtlCol="0" wrap="none" anchor="ctr"/>
           <a:lstStyle/>
           <a:p>
-            <a:pPr algn="ctr"/>
+            <a:pPr algn="l"/>
             <a:r>
               <a:rPr lang="en-US" smtClean="0" sz="2000">
                 <a:solidFill>
@@ -1646,7 +1646,7 @@
           <a:bodyPr rtlCol="0" wrap="none" anchor="ctr"/>
           <a:lstStyle/>
           <a:p>
-            <a:pPr algn="ctr"/>
+            <a:pPr algn="l"/>
             <a:r>
               <a:rPr lang="en-US" smtClean="0" sz="2000">
                 <a:solidFill>
@@ -1680,7 +1680,7 @@
           <a:bodyPr rtlCol="0" wrap="none" anchor="ctr"/>
           <a:lstStyle/>
           <a:p>
-            <a:pPr algn="ctr"/>
+            <a:pPr algn="l"/>
             <a:r>
               <a:rPr lang="en-US" smtClean="0" sz="2000">
                 <a:solidFill>
@@ -1714,7 +1714,7 @@
           <a:bodyPr rtlCol="0" wrap="none" anchor="ctr"/>
           <a:lstStyle/>
           <a:p>
-            <a:pPr algn="ctr"/>
+            <a:pPr algn="l"/>
             <a:r>
               <a:rPr lang="en-US" smtClean="0" sz="2000">
                 <a:solidFill>
@@ -1748,7 +1748,7 @@
           <a:bodyPr rtlCol="0" wrap="none" anchor="ctr"/>
           <a:lstStyle/>
           <a:p>
-            <a:pPr algn="ctr"/>
+            <a:pPr algn="l"/>
             <a:r>
               <a:rPr lang="en-US" smtClean="0" sz="2000">
                 <a:solidFill>
@@ -1782,7 +1782,7 @@
           <a:bodyPr rtlCol="0" wrap="none" anchor="ctr"/>
           <a:lstStyle/>
           <a:p>
-            <a:pPr algn="ctr"/>
+            <a:pPr algn="l"/>
             <a:r>
               <a:rPr lang="en-US" smtClean="0" sz="2000">
                 <a:solidFill>
@@ -1816,7 +1816,7 @@
           <a:bodyPr rtlCol="0" wrap="none" anchor="ctr"/>
           <a:lstStyle/>
           <a:p>
-            <a:pPr algn="ctr"/>
+            <a:pPr algn="l"/>
             <a:r>
               <a:rPr lang="en-US" smtClean="0" sz="2000">
                 <a:solidFill>
@@ -1850,7 +1850,7 @@
           <a:bodyPr rtlCol="0" wrap="none" anchor="ctr"/>
           <a:lstStyle/>
           <a:p>
-            <a:pPr algn="ctr"/>
+            <a:pPr algn="l"/>
             <a:r>
               <a:rPr lang="en-US" smtClean="0" sz="2000">
                 <a:solidFill>
@@ -1884,7 +1884,7 @@
           <a:bodyPr rtlCol="0" wrap="none" anchor="ctr"/>
           <a:lstStyle/>
           <a:p>
-            <a:pPr algn="ctr"/>
+            <a:pPr algn="l"/>
             <a:r>
               <a:rPr lang="en-US" smtClean="0" sz="2000">
                 <a:solidFill>
@@ -1918,7 +1918,7 @@
           <a:bodyPr rtlCol="0" wrap="none" anchor="ctr"/>
           <a:lstStyle/>
           <a:p>
-            <a:pPr algn="ctr"/>
+            <a:pPr algn="l"/>
             <a:r>
               <a:rPr lang="en-US" smtClean="0" sz="2000">
                 <a:solidFill>
@@ -1952,7 +1952,7 @@
           <a:bodyPr rtlCol="0" wrap="none" anchor="ctr"/>
           <a:lstStyle/>
           <a:p>
-            <a:pPr algn="ctr"/>
+            <a:pPr algn="l"/>
             <a:r>
               <a:rPr lang="en-US" smtClean="0" sz="2000">
                 <a:solidFill>
@@ -1986,7 +1986,7 @@
           <a:bodyPr rtlCol="0" wrap="none" anchor="ctr"/>
           <a:lstStyle/>
           <a:p>
-            <a:pPr algn="ctr"/>
+            <a:pPr algn="l"/>
             <a:r>
               <a:rPr lang="en-US" smtClean="0" sz="2000">
                 <a:solidFill>
@@ -2020,7 +2020,7 @@
           <a:bodyPr rtlCol="0" wrap="none" anchor="ctr"/>
           <a:lstStyle/>
           <a:p>
-            <a:pPr algn="ctr"/>
+            <a:pPr algn="l"/>
             <a:r>
               <a:rPr lang="en-US" smtClean="0" sz="2000">
                 <a:solidFill>
@@ -2054,7 +2054,7 @@
           <a:bodyPr rtlCol="0" wrap="none" anchor="ctr"/>
           <a:lstStyle/>
           <a:p>
-            <a:pPr algn="ctr"/>
+            <a:pPr algn="l"/>
             <a:r>
               <a:rPr lang="en-US" smtClean="0" sz="2000">
                 <a:solidFill>
@@ -2088,7 +2088,7 @@
           <a:bodyPr rtlCol="0" wrap="none" anchor="ctr"/>
           <a:lstStyle/>
           <a:p>
-            <a:pPr algn="ctr"/>
+            <a:pPr algn="l"/>
             <a:r>
               <a:rPr lang="en-US" smtClean="0" sz="2000">
                 <a:solidFill>
@@ -2122,7 +2122,7 @@
           <a:bodyPr rtlCol="0" wrap="none" anchor="ctr"/>
           <a:lstStyle/>
           <a:p>
-            <a:pPr algn="ctr"/>
+            <a:pPr algn="l"/>
             <a:r>
               <a:rPr lang="en-US" smtClean="0" sz="2000">
                 <a:solidFill>
@@ -2156,7 +2156,7 @@
           <a:bodyPr rtlCol="0" wrap="none" anchor="ctr"/>
           <a:lstStyle/>
           <a:p>
-            <a:pPr algn="ctr"/>
+            <a:pPr algn="l"/>
             <a:r>
               <a:rPr lang="en-US" smtClean="0" sz="2000">
                 <a:solidFill>
@@ -2190,7 +2190,7 @@
           <a:bodyPr rtlCol="0" wrap="none" anchor="ctr"/>
           <a:lstStyle/>
           <a:p>
-            <a:pPr algn="ctr"/>
+            <a:pPr algn="l"/>
             <a:r>
               <a:rPr lang="en-US" smtClean="0" sz="2000">
                 <a:solidFill>
@@ -2224,7 +2224,7 @@
           <a:bodyPr rtlCol="0" wrap="none" anchor="ctr"/>
           <a:lstStyle/>
           <a:p>
-            <a:pPr algn="ctr"/>
+            <a:pPr algn="l"/>
             <a:r>
               <a:rPr lang="en-US" smtClean="0" sz="2000">
                 <a:solidFill>
@@ -2258,7 +2258,7 @@
           <a:bodyPr rtlCol="0" wrap="none" anchor="ctr"/>
           <a:lstStyle/>
           <a:p>
-            <a:pPr algn="ctr"/>
+            <a:pPr algn="l"/>
             <a:r>
               <a:rPr lang="en-US" smtClean="0" sz="2000">
                 <a:solidFill>
@@ -2292,7 +2292,7 @@
           <a:bodyPr rtlCol="0" wrap="none" anchor="ctr"/>
           <a:lstStyle/>
           <a:p>
-            <a:pPr algn="ctr"/>
+            <a:pPr algn="l"/>
             <a:r>
               <a:rPr lang="en-US" smtClean="0" sz="2000">
                 <a:solidFill>

</xml_diff>